<commit_message>
drag and drop actions
</commit_message>
<xml_diff>
--- a/src/main/resources/org/sikuli/slides/api/examples/helloworld.pptx
+++ b/src/main/resources/org/sikuli/slides/api/examples/helloworld.pptx
@@ -288,7 +288,7 @@
           <a:p>
             <a:fld id="{1731B5C5-7929-0441-97C2-0CF01CC7D898}" type="datetimeFigureOut">
               <a:rPr lang="en-US" smtClean="0"/>
-              <a:t>8/4/13</a:t>
+              <a:t>8/11/13</a:t>
             </a:fld>
             <a:endParaRPr lang="en-US"/>
           </a:p>
@@ -458,7 +458,7 @@
           <a:p>
             <a:fld id="{1731B5C5-7929-0441-97C2-0CF01CC7D898}" type="datetimeFigureOut">
               <a:rPr lang="en-US" smtClean="0"/>
-              <a:t>8/4/13</a:t>
+              <a:t>8/11/13</a:t>
             </a:fld>
             <a:endParaRPr lang="en-US"/>
           </a:p>
@@ -638,7 +638,7 @@
           <a:p>
             <a:fld id="{1731B5C5-7929-0441-97C2-0CF01CC7D898}" type="datetimeFigureOut">
               <a:rPr lang="en-US" smtClean="0"/>
-              <a:t>8/4/13</a:t>
+              <a:t>8/11/13</a:t>
             </a:fld>
             <a:endParaRPr lang="en-US"/>
           </a:p>
@@ -808,7 +808,7 @@
           <a:p>
             <a:fld id="{1731B5C5-7929-0441-97C2-0CF01CC7D898}" type="datetimeFigureOut">
               <a:rPr lang="en-US" smtClean="0"/>
-              <a:t>8/4/13</a:t>
+              <a:t>8/11/13</a:t>
             </a:fld>
             <a:endParaRPr lang="en-US"/>
           </a:p>
@@ -1054,7 +1054,7 @@
           <a:p>
             <a:fld id="{1731B5C5-7929-0441-97C2-0CF01CC7D898}" type="datetimeFigureOut">
               <a:rPr lang="en-US" smtClean="0"/>
-              <a:t>8/4/13</a:t>
+              <a:t>8/11/13</a:t>
             </a:fld>
             <a:endParaRPr lang="en-US"/>
           </a:p>
@@ -1342,7 +1342,7 @@
           <a:p>
             <a:fld id="{1731B5C5-7929-0441-97C2-0CF01CC7D898}" type="datetimeFigureOut">
               <a:rPr lang="en-US" smtClean="0"/>
-              <a:t>8/4/13</a:t>
+              <a:t>8/11/13</a:t>
             </a:fld>
             <a:endParaRPr lang="en-US"/>
           </a:p>
@@ -1764,7 +1764,7 @@
           <a:p>
             <a:fld id="{1731B5C5-7929-0441-97C2-0CF01CC7D898}" type="datetimeFigureOut">
               <a:rPr lang="en-US" smtClean="0"/>
-              <a:t>8/4/13</a:t>
+              <a:t>8/11/13</a:t>
             </a:fld>
             <a:endParaRPr lang="en-US"/>
           </a:p>
@@ -1882,7 +1882,7 @@
           <a:p>
             <a:fld id="{1731B5C5-7929-0441-97C2-0CF01CC7D898}" type="datetimeFigureOut">
               <a:rPr lang="en-US" smtClean="0"/>
-              <a:t>8/4/13</a:t>
+              <a:t>8/11/13</a:t>
             </a:fld>
             <a:endParaRPr lang="en-US"/>
           </a:p>
@@ -1977,7 +1977,7 @@
           <a:p>
             <a:fld id="{1731B5C5-7929-0441-97C2-0CF01CC7D898}" type="datetimeFigureOut">
               <a:rPr lang="en-US" smtClean="0"/>
-              <a:t>8/4/13</a:t>
+              <a:t>8/11/13</a:t>
             </a:fld>
             <a:endParaRPr lang="en-US"/>
           </a:p>
@@ -2254,7 +2254,7 @@
           <a:p>
             <a:fld id="{1731B5C5-7929-0441-97C2-0CF01CC7D898}" type="datetimeFigureOut">
               <a:rPr lang="en-US" smtClean="0"/>
-              <a:t>8/4/13</a:t>
+              <a:t>8/11/13</a:t>
             </a:fld>
             <a:endParaRPr lang="en-US"/>
           </a:p>
@@ -2507,7 +2507,7 @@
           <a:p>
             <a:fld id="{1731B5C5-7929-0441-97C2-0CF01CC7D898}" type="datetimeFigureOut">
               <a:rPr lang="en-US" smtClean="0"/>
-              <a:t>8/4/13</a:t>
+              <a:t>8/11/13</a:t>
             </a:fld>
             <a:endParaRPr lang="en-US"/>
           </a:p>
@@ -2720,7 +2720,7 @@
           <a:p>
             <a:fld id="{1731B5C5-7929-0441-97C2-0CF01CC7D898}" type="datetimeFigureOut">
               <a:rPr lang="en-US" smtClean="0"/>
-              <a:t>8/4/13</a:t>
+              <a:t>8/11/13</a:t>
             </a:fld>
             <a:endParaRPr lang="en-US"/>
           </a:p>
@@ -3103,13 +3103,15 @@
         </p:nvSpPr>
         <p:spPr>
           <a:xfrm>
-            <a:off x="3228158" y="2654478"/>
-            <a:ext cx="2425363" cy="646331"/>
+            <a:off x="2357300" y="2654478"/>
+            <a:ext cx="4292611" cy="1107996"/>
           </a:xfrm>
           <a:prstGeom prst="rect">
             <a:avLst/>
           </a:prstGeom>
-          <a:noFill/>
+          <a:solidFill>
+            <a:srgbClr val="FFFF00"/>
+          </a:solidFill>
         </p:spPr>
         <p:txBody>
           <a:bodyPr wrap="none" rtlCol="0">
@@ -3118,10 +3120,10 @@
           <a:lstStyle/>
           <a:p>
             <a:r>
-              <a:rPr lang="en-US" sz="3600" dirty="0" smtClean="0"/>
+              <a:rPr lang="en-US" sz="6600" dirty="0" smtClean="0"/>
               <a:t>Hello World</a:t>
             </a:r>
-            <a:endParaRPr lang="en-US" sz="3600" dirty="0"/>
+            <a:endParaRPr lang="en-US" sz="6600" dirty="0"/>
           </a:p>
         </p:txBody>
       </p:sp>

</xml_diff>